<commit_message>
fixed presentation for NIS 12.11.19
</commit_message>
<xml_diff>
--- a/presentations/RUSNLP.pptx
+++ b/presentations/RUSNLP.pptx
@@ -27,14 +27,14 @@
   <p:notesSz cx="6858000" cy="9144000"/>
   <p:embeddedFontLst>
     <p:embeddedFont>
-      <p:font typeface="Lato" panose="020B0604020202020204" charset="0"/>
+      <p:font typeface="Raleway" panose="020B0604020202020204" charset="0"/>
       <p:regular r:id="rId17"/>
       <p:bold r:id="rId18"/>
       <p:italic r:id="rId19"/>
       <p:boldItalic r:id="rId20"/>
     </p:embeddedFont>
     <p:embeddedFont>
-      <p:font typeface="Raleway" panose="020B0604020202020204" charset="0"/>
+      <p:font typeface="Lato" panose="020B0604020202020204" charset="0"/>
       <p:regular r:id="rId21"/>
       <p:bold r:id="rId22"/>
       <p:italic r:id="rId23"/>
@@ -272,7 +272,7 @@
   </p:defaultTextStyle>
   <p:extLst>
     <p:ext uri="{EFAFB233-063F-42B5-8137-9DF3F51BA10A}">
-      <p15:sldGuideLst xmlns="" xmlns:mc="http://schemas.openxmlformats.org/markup-compatibility/2006" xmlns:mv="urn:schemas-microsoft-com:mac:vml" xmlns:c="http://schemas.openxmlformats.org/drawingml/2006/chart" xmlns:dgm="http://schemas.openxmlformats.org/drawingml/2006/diagram" xmlns:o="urn:schemas-microsoft-com:office:office" xmlns:v="urn:schemas-microsoft-com:vml" xmlns:pvml="urn:schemas-microsoft-com:office:powerpoint" xmlns:com="http://schemas.openxmlformats.org/drawingml/2006/compatibility" xmlns:p14="http://schemas.microsoft.com/office/powerpoint/2010/main" xmlns:p15="http://schemas.microsoft.com/office/powerpoint/2012/main">
+      <p15:sldGuideLst xmlns:p15="http://schemas.microsoft.com/office/powerpoint/2012/main" xmlns:p14="http://schemas.microsoft.com/office/powerpoint/2010/main" xmlns:com="http://schemas.openxmlformats.org/drawingml/2006/compatibility" xmlns:pvml="urn:schemas-microsoft-com:office:powerpoint" xmlns:v="urn:schemas-microsoft-com:vml" xmlns:o="urn:schemas-microsoft-com:office:office" xmlns:dgm="http://schemas.openxmlformats.org/drawingml/2006/diagram" xmlns:c="http://schemas.openxmlformats.org/drawingml/2006/chart" xmlns:mv="urn:schemas-microsoft-com:mac:vml" xmlns:mc="http://schemas.openxmlformats.org/markup-compatibility/2006" xmlns="">
         <p15:guide id="1" orient="horz" pos="1620">
           <p15:clr>
             <a:srgbClr val="A4A3A4"/>
@@ -1076,7 +1076,7 @@
         </p:nvSpPr>
         <p:spPr>
           <a:xfrm>
-            <a:off x="381300" y="685800"/>
+            <a:off x="381000" y="685800"/>
             <a:ext cx="6096000" cy="3429000"/>
           </a:xfrm>
           <a:custGeom>
@@ -1284,7 +1284,7 @@
         </p:nvSpPr>
         <p:spPr>
           <a:xfrm>
-            <a:off x="381300" y="685800"/>
+            <a:off x="381000" y="685800"/>
             <a:ext cx="6096000" cy="3429000"/>
           </a:xfrm>
           <a:custGeom>
@@ -9220,7 +9220,7 @@
         <p:spPr>
           <a:xfrm>
             <a:off x="651450" y="1505075"/>
-            <a:ext cx="7863000" cy="2054700"/>
+            <a:ext cx="7730550" cy="2976870"/>
           </a:xfrm>
           <a:prstGeom prst="rect">
             <a:avLst/>
@@ -9275,41 +9275,20 @@
               <a:buAutoNum type="arabicPeriod"/>
             </a:pPr>
             <a:r>
-              <a:rPr lang="ru" sz="1800" dirty="0">
+              <a:rPr lang="ru" sz="1800" dirty="0" smtClean="0">
                 <a:solidFill>
                   <a:srgbClr val="000000"/>
                 </a:solidFill>
               </a:rPr>
-              <a:t>Добавить данные русскоязычных статей </a:t>
+              <a:t>Разобраться </a:t>
             </a:r>
-            <a:endParaRPr sz="1800" dirty="0">
-              <a:solidFill>
-                <a:srgbClr val="000000"/>
-              </a:solidFill>
-              <a:latin typeface="Lato" panose="020B0604020202020204" charset="0"/>
-            </a:endParaRPr>
-          </a:p>
-          <a:p>
-            <a:pPr marL="457200" lvl="0" indent="-342900" algn="l" rtl="0">
-              <a:spcBef>
-                <a:spcPts val="0"/>
-              </a:spcBef>
-              <a:spcAft>
-                <a:spcPts val="0"/>
-              </a:spcAft>
-              <a:buClr>
-                <a:srgbClr val="000000"/>
-              </a:buClr>
-              <a:buSzPts val="1800"/>
-              <a:buAutoNum type="arabicPeriod"/>
-            </a:pPr>
             <a:r>
               <a:rPr lang="ru" sz="1800" dirty="0">
                 <a:solidFill>
                   <a:srgbClr val="000000"/>
                 </a:solidFill>
               </a:rPr>
-              <a:t>Разобраться в существующих способах векторного представления текстов</a:t>
+              <a:t>в существующих способах векторного представления текстов</a:t>
             </a:r>
             <a:endParaRPr sz="1800" dirty="0">
               <a:solidFill>
@@ -9367,7 +9346,31 @@
                   <a:srgbClr val="000000"/>
                 </a:solidFill>
               </a:rPr>
-              <a:t>Оценить эти методы</a:t>
+              <a:t>Оценить эти </a:t>
+            </a:r>
+            <a:r>
+              <a:rPr lang="ru" sz="1800" dirty="0" smtClean="0">
+                <a:solidFill>
+                  <a:srgbClr val="000000"/>
+                </a:solidFill>
+              </a:rPr>
+              <a:t>методы на тестовом заднии (рус. </a:t>
+            </a:r>
+            <a:r>
+              <a:rPr lang="ru-RU" sz="1800" dirty="0" smtClean="0">
+                <a:solidFill>
+                  <a:srgbClr val="000000"/>
+                </a:solidFill>
+              </a:rPr>
+              <a:t>и</a:t>
+            </a:r>
+            <a:r>
+              <a:rPr lang="ru" sz="1800" dirty="0" smtClean="0">
+                <a:solidFill>
+                  <a:srgbClr val="000000"/>
+                </a:solidFill>
+              </a:rPr>
+              <a:t> англ. википедия )</a:t>
             </a:r>
             <a:endParaRPr sz="1800" dirty="0">
               <a:solidFill>
@@ -9396,7 +9399,15 @@
                   <a:srgbClr val="000000"/>
                 </a:solidFill>
               </a:rPr>
-              <a:t>Выбрать лучший подход и обучить модель на наших данных</a:t>
+              <a:t>Выбрать лучший подход и </a:t>
+            </a:r>
+            <a:r>
+              <a:rPr lang="ru" sz="1800" dirty="0" smtClean="0">
+                <a:solidFill>
+                  <a:srgbClr val="000000"/>
+                </a:solidFill>
+              </a:rPr>
+              <a:t>применить предобученную модель к нашим данным</a:t>
             </a:r>
             <a:endParaRPr sz="1800" dirty="0">
               <a:solidFill>
@@ -9908,8 +9919,8 @@
         </p:nvSpPr>
         <p:spPr>
           <a:xfrm>
-            <a:off x="653250" y="1601375"/>
-            <a:ext cx="5719500" cy="1304700"/>
+            <a:off x="653249" y="1601374"/>
+            <a:ext cx="7908860" cy="1792989"/>
           </a:xfrm>
           <a:prstGeom prst="rect">
             <a:avLst/>
@@ -9935,45 +9946,184 @@
               <a:buChar char="●"/>
             </a:pPr>
             <a:r>
-              <a:rPr lang="ru" sz="1800">
+              <a:rPr lang="ru" sz="1800" dirty="0">
                 <a:solidFill>
                   <a:srgbClr val="000000"/>
                 </a:solidFill>
               </a:rPr>
               <a:t>Сложно разобраться в теме практически с нуля</a:t>
             </a:r>
-            <a:endParaRPr sz="1800">
+            <a:endParaRPr sz="1800" dirty="0">
               <a:solidFill>
                 <a:srgbClr val="000000"/>
               </a:solidFill>
             </a:endParaRPr>
           </a:p>
           <a:p>
-            <a:pPr marL="457200" lvl="0" indent="-342900" algn="l" rtl="0">
-              <a:spcBef>
-                <a:spcPts val="0"/>
-              </a:spcBef>
-              <a:spcAft>
-                <a:spcPts val="0"/>
-              </a:spcAft>
+            <a:pPr lvl="0" indent="-342900">
               <a:buClr>
                 <a:srgbClr val="000000"/>
               </a:buClr>
               <a:buSzPts val="1800"/>
-              <a:buChar char="●"/>
             </a:pPr>
             <a:r>
-              <a:rPr lang="ru" sz="1800">
+              <a:rPr lang="ru" sz="1800" dirty="0" smtClean="0">
                 <a:solidFill>
                   <a:srgbClr val="000000"/>
                 </a:solidFill>
               </a:rPr>
-              <a:t>Необходимо размечать данные вручную</a:t>
+              <a:t>Необходимо устанавливать соотвествия между англоязычными и русскоязычными именами и из вариантами (</a:t>
             </a:r>
-            <a:endParaRPr sz="1800">
+            <a:r>
+              <a:rPr lang="ru-RU" sz="1800" dirty="0" smtClean="0">
+                <a:solidFill>
+                  <a:srgbClr val="000000"/>
+                </a:solidFill>
+              </a:rPr>
+              <a:t>Анастасия </a:t>
+            </a:r>
+            <a:r>
+              <a:rPr lang="ru-RU" sz="1800" dirty="0" err="1" smtClean="0">
+                <a:solidFill>
+                  <a:srgbClr val="000000"/>
+                </a:solidFill>
+              </a:rPr>
+              <a:t>Бонч-Осмоловская</a:t>
+            </a:r>
+            <a:r>
+              <a:rPr lang="ru-RU" sz="1800" dirty="0" smtClean="0">
+                <a:solidFill>
+                  <a:srgbClr val="000000"/>
+                </a:solidFill>
+              </a:rPr>
+              <a:t> = </a:t>
+            </a:r>
+            <a:r>
+              <a:rPr lang="ru-RU" sz="1800" dirty="0" err="1" smtClean="0">
+                <a:solidFill>
+                  <a:srgbClr val="000000"/>
+                </a:solidFill>
+              </a:rPr>
+              <a:t>Бонч-Осмоловская</a:t>
+            </a:r>
+            <a:r>
+              <a:rPr lang="ru-RU" sz="1800" dirty="0" smtClean="0">
+                <a:solidFill>
+                  <a:srgbClr val="000000"/>
+                </a:solidFill>
+              </a:rPr>
+              <a:t> </a:t>
+            </a:r>
+            <a:r>
+              <a:rPr lang="ru-RU" sz="1800" dirty="0">
+                <a:solidFill>
+                  <a:srgbClr val="000000"/>
+                </a:solidFill>
+              </a:rPr>
+              <a:t>А. А</a:t>
+            </a:r>
+            <a:r>
+              <a:rPr lang="ru-RU" sz="1800" dirty="0" smtClean="0">
+                <a:solidFill>
+                  <a:srgbClr val="000000"/>
+                </a:solidFill>
+              </a:rPr>
+              <a:t>.</a:t>
+            </a:r>
+            <a:r>
+              <a:rPr lang="ru-RU" sz="1800" dirty="0" smtClean="0">
+                <a:solidFill>
+                  <a:schemeClr val="bg2"/>
+                </a:solidFill>
+              </a:rPr>
+              <a:t> </a:t>
+            </a:r>
+            <a:r>
+              <a:rPr lang="ru-RU" sz="1800" dirty="0" smtClean="0">
+                <a:solidFill>
+                  <a:schemeClr val="bg2"/>
+                </a:solidFill>
+                <a:latin typeface="Arial" panose="020B0604020202020204" pitchFamily="34" charset="0"/>
+                <a:cs typeface="Arial" panose="020B0604020202020204" pitchFamily="34" charset="0"/>
+              </a:rPr>
+              <a:t>= </a:t>
+            </a:r>
+            <a:r>
+              <a:rPr lang="de-AT" sz="1800" dirty="0" err="1">
+                <a:solidFill>
+                  <a:schemeClr val="bg2"/>
+                </a:solidFill>
+                <a:latin typeface="Arial" panose="020B0604020202020204" pitchFamily="34" charset="0"/>
+                <a:cs typeface="Arial" panose="020B0604020202020204" pitchFamily="34" charset="0"/>
+              </a:rPr>
+              <a:t>Bonch-Osmolovskaya</a:t>
+            </a:r>
+            <a:r>
+              <a:rPr lang="de-AT" sz="1800" dirty="0">
+                <a:solidFill>
+                  <a:schemeClr val="bg2"/>
+                </a:solidFill>
+                <a:latin typeface="Arial" panose="020B0604020202020204" pitchFamily="34" charset="0"/>
+                <a:cs typeface="Arial" panose="020B0604020202020204" pitchFamily="34" charset="0"/>
+              </a:rPr>
+              <a:t> A. A</a:t>
+            </a:r>
+            <a:r>
+              <a:rPr lang="de-AT" sz="1800" dirty="0" smtClean="0">
+                <a:solidFill>
+                  <a:schemeClr val="bg2"/>
+                </a:solidFill>
+                <a:latin typeface="Arial" panose="020B0604020202020204" pitchFamily="34" charset="0"/>
+                <a:cs typeface="Arial" panose="020B0604020202020204" pitchFamily="34" charset="0"/>
+              </a:rPr>
+              <a:t>.</a:t>
+            </a:r>
+            <a:r>
+              <a:rPr lang="ru-RU" sz="1800" dirty="0" smtClean="0">
+                <a:solidFill>
+                  <a:schemeClr val="bg2"/>
+                </a:solidFill>
+                <a:latin typeface="Arial" panose="020B0604020202020204" pitchFamily="34" charset="0"/>
+                <a:cs typeface="Arial" panose="020B0604020202020204" pitchFamily="34" charset="0"/>
+              </a:rPr>
+              <a:t> = </a:t>
+            </a:r>
+            <a:r>
+              <a:rPr lang="de-AT" sz="1800" dirty="0">
+                <a:solidFill>
+                  <a:schemeClr val="bg2"/>
+                </a:solidFill>
+                <a:latin typeface="Arial" panose="020B0604020202020204" pitchFamily="34" charset="0"/>
+                <a:cs typeface="Arial" panose="020B0604020202020204" pitchFamily="34" charset="0"/>
+              </a:rPr>
+              <a:t>Anastasia </a:t>
+            </a:r>
+            <a:r>
+              <a:rPr lang="de-AT" sz="1800" dirty="0" err="1" smtClean="0">
+                <a:solidFill>
+                  <a:schemeClr val="bg2"/>
+                </a:solidFill>
+                <a:latin typeface="Arial" panose="020B0604020202020204" pitchFamily="34" charset="0"/>
+                <a:cs typeface="Arial" panose="020B0604020202020204" pitchFamily="34" charset="0"/>
+              </a:rPr>
+              <a:t>Bonch-Osmolovskaya</a:t>
+            </a:r>
+            <a:r>
+              <a:rPr lang="ru" sz="1800" dirty="0" smtClean="0">
+                <a:solidFill>
+                  <a:srgbClr val="000000"/>
+                </a:solidFill>
+                <a:latin typeface="Arial" panose="020B0604020202020204" pitchFamily="34" charset="0"/>
+                <a:cs typeface="Arial" panose="020B0604020202020204" pitchFamily="34" charset="0"/>
+              </a:rPr>
+              <a:t>)</a:t>
+            </a:r>
+            <a:endParaRPr sz="1800" dirty="0">
               <a:solidFill>
                 <a:srgbClr val="000000"/>
               </a:solidFill>
+              <a:latin typeface="Arial" panose="020B0604020202020204" pitchFamily="34" charset="0"/>
+              <a:cs typeface="Arial" panose="020B0604020202020204" pitchFamily="34" charset="0"/>
             </a:endParaRPr>
           </a:p>
         </p:txBody>
@@ -10267,10 +10417,10 @@
               <a:buNone/>
             </a:pPr>
             <a:r>
-              <a:rPr lang="ru" sz="3000"/>
+              <a:rPr lang="ru" sz="3200" dirty="0"/>
               <a:t>Спасибо за внимание!</a:t>
             </a:r>
-            <a:endParaRPr sz="3000"/>
+            <a:endParaRPr sz="3200" dirty="0"/>
           </a:p>
         </p:txBody>
       </p:sp>
@@ -10376,14 +10526,14 @@
               <a:buNone/>
             </a:pPr>
             <a:r>
-              <a:rPr lang="ru" sz="1600">
+              <a:rPr lang="ru" sz="1600" dirty="0">
                 <a:solidFill>
                   <a:srgbClr val="000000"/>
                 </a:solidFill>
               </a:rPr>
               <a:t>RusNLP_MAP -  это поисковик по статьям, опубликованным на российских NLP-конференциях: Диалог, AIST, AINL</a:t>
             </a:r>
-            <a:endParaRPr sz="1600">
+            <a:endParaRPr sz="1600" dirty="0">
               <a:solidFill>
                 <a:srgbClr val="000000"/>
               </a:solidFill>
@@ -10400,7 +10550,7 @@
               <a:buNone/>
             </a:pPr>
             <a:r>
-              <a:rPr lang="ru" sz="1600">
+              <a:rPr lang="ru" sz="1600" dirty="0">
                 <a:solidFill>
                   <a:srgbClr val="000000"/>
                 </a:solidFill>
@@ -10408,7 +10558,7 @@
               <a:t>Вопросы, на которые может ответить </a:t>
             </a:r>
             <a:r>
-              <a:rPr lang="ru" sz="1600" b="1">
+              <a:rPr lang="ru" sz="1600" b="1" dirty="0">
                 <a:solidFill>
                   <a:srgbClr val="000000"/>
                 </a:solidFill>
@@ -10416,14 +10566,14 @@
               <a:t>RusNLP</a:t>
             </a:r>
             <a:r>
-              <a:rPr lang="ru" sz="1600">
+              <a:rPr lang="ru" sz="1600" dirty="0">
                 <a:solidFill>
                   <a:srgbClr val="000000"/>
                 </a:solidFill>
               </a:rPr>
               <a:t>:</a:t>
             </a:r>
-            <a:endParaRPr sz="1600">
+            <a:endParaRPr sz="1600" dirty="0">
               <a:solidFill>
                 <a:srgbClr val="000000"/>
               </a:solidFill>
@@ -10445,14 +10595,14 @@
               <a:buChar char="●"/>
             </a:pPr>
             <a:r>
-              <a:rPr lang="ru" sz="1600" i="1">
+              <a:rPr lang="ru" sz="1600" i="1" dirty="0">
                 <a:solidFill>
                   <a:srgbClr val="000000"/>
                 </a:solidFill>
               </a:rPr>
               <a:t>Какие есть публикации в российском NLP, похожие на уже известную мне статью?</a:t>
             </a:r>
-            <a:endParaRPr sz="1600" i="1">
+            <a:endParaRPr sz="1600" i="1" dirty="0">
               <a:solidFill>
                 <a:srgbClr val="000000"/>
               </a:solidFill>
@@ -10474,14 +10624,14 @@
               <a:buChar char="●"/>
             </a:pPr>
             <a:r>
-              <a:rPr lang="ru" sz="1600" i="1">
+              <a:rPr lang="ru" sz="1600" i="1" dirty="0">
                 <a:solidFill>
                   <a:srgbClr val="000000"/>
                 </a:solidFill>
               </a:rPr>
               <a:t>Что публиковали в 2008 году компьютерные лингвисты из МГУ?</a:t>
             </a:r>
-            <a:endParaRPr sz="1600" i="1">
+            <a:endParaRPr sz="1600" i="1" dirty="0">
               <a:solidFill>
                 <a:srgbClr val="000000"/>
               </a:solidFill>
@@ -10503,14 +10653,14 @@
               <a:buChar char="●"/>
             </a:pPr>
             <a:r>
-              <a:rPr lang="ru" sz="1600" i="1">
+              <a:rPr lang="ru" sz="1600" i="1" dirty="0">
                 <a:solidFill>
                   <a:srgbClr val="000000"/>
                 </a:solidFill>
               </a:rPr>
               <a:t>Представляли ли в 2015 году на конференции AINL какие-либо исследования, связанные с перифразированием?</a:t>
             </a:r>
-            <a:endParaRPr sz="1600">
+            <a:endParaRPr sz="1600" dirty="0">
               <a:solidFill>
                 <a:srgbClr val="000000"/>
               </a:solidFill>
@@ -10934,14 +11084,46 @@
               <a:buChar char="●"/>
             </a:pPr>
             <a:r>
-              <a:rPr lang="ru" sz="1400" dirty="0">
+              <a:rPr lang="ru-RU" sz="1400" dirty="0">
                 <a:solidFill>
                   <a:srgbClr val="000000"/>
                 </a:solidFill>
               </a:rPr>
-              <a:t>455 статей на английском </a:t>
+              <a:t>о</a:t>
             </a:r>
-            <a:endParaRPr sz="1400" dirty="0">
+            <a:r>
+              <a:rPr lang="ru" sz="1400" dirty="0" smtClean="0">
+                <a:solidFill>
+                  <a:srgbClr val="000000"/>
+                </a:solidFill>
+              </a:rPr>
+              <a:t>коло 2 000 статей</a:t>
+            </a:r>
+            <a:endParaRPr sz="1400" dirty="0" smtClean="0">
+              <a:solidFill>
+                <a:srgbClr val="000000"/>
+              </a:solidFill>
+            </a:endParaRPr>
+          </a:p>
+          <a:p>
+            <a:pPr marL="914400" lvl="0" indent="-317500">
+              <a:lnSpc>
+                <a:spcPct val="100000"/>
+              </a:lnSpc>
+              <a:buClr>
+                <a:srgbClr val="000000"/>
+              </a:buClr>
+              <a:buSzPts val="1400"/>
+            </a:pPr>
+            <a:r>
+              <a:rPr lang="ru" sz="1400" dirty="0" smtClean="0">
+                <a:solidFill>
+                  <a:srgbClr val="000000"/>
+                </a:solidFill>
+              </a:rPr>
+              <a:t>500 ст. на английском, остальные – на русском </a:t>
+            </a:r>
+            <a:endParaRPr sz="1400" dirty="0" smtClean="0">
               <a:solidFill>
                 <a:srgbClr val="000000"/>
               </a:solidFill>
@@ -10965,76 +11147,22 @@
               <a:buChar char="●"/>
             </a:pPr>
             <a:r>
-              <a:rPr lang="ru" sz="1400" dirty="0">
+              <a:rPr lang="ru-RU" sz="1400" dirty="0">
                 <a:solidFill>
                   <a:srgbClr val="000000"/>
                 </a:solidFill>
               </a:rPr>
-              <a:t>423 уникальных авторов </a:t>
+              <a:t>в</a:t>
             </a:r>
-            <a:endParaRPr sz="1400" dirty="0">
-              <a:solidFill>
-                <a:srgbClr val="000000"/>
-              </a:solidFill>
-            </a:endParaRPr>
-          </a:p>
-          <a:p>
-            <a:pPr marL="914400" lvl="0" indent="-317500" algn="l" rtl="0">
-              <a:lnSpc>
-                <a:spcPct val="100000"/>
-              </a:lnSpc>
-              <a:spcBef>
-                <a:spcPts val="0"/>
-              </a:spcBef>
-              <a:spcAft>
-                <a:spcPts val="0"/>
-              </a:spcAft>
-              <a:buClr>
-                <a:srgbClr val="000000"/>
-              </a:buClr>
-              <a:buSzPts val="1400"/>
-              <a:buChar char="●"/>
-            </a:pPr>
             <a:r>
-              <a:rPr lang="ru" sz="1400" dirty="0">
+              <a:rPr lang="ru" sz="1400" dirty="0" smtClean="0">
                 <a:solidFill>
                   <a:srgbClr val="000000"/>
                 </a:solidFill>
               </a:rPr>
-              <a:t>100 аффилиаций</a:t>
+              <a:t>о всех статьях размечены метаданные: авторы, аффилиации, аннотации и т.д.</a:t>
             </a:r>
-            <a:endParaRPr sz="1400" dirty="0">
-              <a:solidFill>
-                <a:srgbClr val="000000"/>
-              </a:solidFill>
-            </a:endParaRPr>
-          </a:p>
-          <a:p>
-            <a:pPr marL="914400" lvl="0" indent="-317500" algn="l" rtl="0">
-              <a:lnSpc>
-                <a:spcPct val="100000"/>
-              </a:lnSpc>
-              <a:spcBef>
-                <a:spcPts val="0"/>
-              </a:spcBef>
-              <a:spcAft>
-                <a:spcPts val="0"/>
-              </a:spcAft>
-              <a:buClr>
-                <a:srgbClr val="000000"/>
-              </a:buClr>
-              <a:buSzPts val="1400"/>
-              <a:buChar char="●"/>
-            </a:pPr>
-            <a:r>
-              <a:rPr lang="ru" sz="1400" dirty="0">
-                <a:solidFill>
-                  <a:srgbClr val="000000"/>
-                </a:solidFill>
-              </a:rPr>
-              <a:t>не менее 1000 русскоязычных статей без разметки</a:t>
-            </a:r>
-            <a:endParaRPr sz="1400" dirty="0">
+            <a:endParaRPr sz="1400" dirty="0" smtClean="0">
               <a:solidFill>
                 <a:srgbClr val="000000"/>
               </a:solidFill>
@@ -11054,7 +11182,7 @@
               <a:buNone/>
             </a:pPr>
             <a:r>
-              <a:rPr lang="ru" sz="1400" dirty="0">
+              <a:rPr lang="ru" sz="1400" dirty="0" smtClean="0">
                 <a:solidFill>
                   <a:srgbClr val="000000"/>
                 </a:solidFill>
@@ -11062,7 +11190,7 @@
               <a:t>Векторизация через </a:t>
             </a:r>
             <a:r>
-              <a:rPr lang="ru" sz="1400" b="1" dirty="0">
+              <a:rPr lang="ru" sz="1400" b="1" dirty="0" smtClean="0">
                 <a:solidFill>
                   <a:srgbClr val="000000"/>
                 </a:solidFill>
@@ -11366,7 +11494,7 @@
         </p:nvSpPr>
         <p:spPr>
           <a:xfrm>
-            <a:off x="216199" y="1907675"/>
+            <a:off x="285469" y="1907675"/>
             <a:ext cx="3108891" cy="1431342"/>
           </a:xfrm>
           <a:prstGeom prst="rect">
@@ -11694,7 +11822,7 @@
         </p:nvGrpSpPr>
         <p:grpSpPr>
           <a:xfrm>
-            <a:off x="579200" y="1348058"/>
+            <a:off x="648470" y="1348058"/>
             <a:ext cx="1309800" cy="572700"/>
             <a:chOff x="807800" y="1188734"/>
             <a:chExt cx="1309800" cy="572700"/>

</xml_diff>